<commit_message>
Edits to topic 7
</commit_message>
<xml_diff>
--- a/topic-07-Layout-1/talk-1/talk-1.pptx
+++ b/topic-07-Layout-1/talk-1/talk-1.pptx
@@ -141,7 +141,7 @@
   </p:defaultTextStyle>
   <p:extLst>
     <p:ext uri="{EFAFB233-063F-42B5-8137-9DF3F51BA10A}">
-      <p15:sldGuideLst xmlns:p15="http://schemas.microsoft.com/office/powerpoint/2012/main" xmlns="">
+      <p15:sldGuideLst xmlns="" xmlns:p15="http://schemas.microsoft.com/office/powerpoint/2012/main">
         <p15:guide id="1" orient="horz" pos="2160">
           <p15:clr>
             <a:srgbClr val="A4A3A4"/>
@@ -240,7 +240,7 @@
           <a:p>
             <a:fld id="{C3B67979-B798-40DB-B440-5D87E6EC6EEF}" type="datetimeFigureOut">
               <a:rPr lang="en-US" smtClean="0"/>
-              <a:t>10/19/2017</a:t>
+              <a:t>10/21/2017</a:t>
             </a:fld>
             <a:endParaRPr lang="en-US"/>
           </a:p>
@@ -1719,7 +1719,7 @@
           <a:p>
             <a:fld id="{4BC48473-ACCD-4242-806A-1249CC2C55A8}" type="datetimeFigureOut">
               <a:rPr lang="en-US" smtClean="0"/>
-              <a:t>10/19/2017</a:t>
+              <a:t>10/21/2017</a:t>
             </a:fld>
             <a:endParaRPr lang="en-US"/>
           </a:p>
@@ -2002,7 +2002,7 @@
           <a:p>
             <a:fld id="{4BC48473-ACCD-4242-806A-1249CC2C55A8}" type="datetimeFigureOut">
               <a:rPr lang="en-US" smtClean="0"/>
-              <a:t>10/19/2017</a:t>
+              <a:t>10/21/2017</a:t>
             </a:fld>
             <a:endParaRPr lang="en-US"/>
           </a:p>
@@ -2182,7 +2182,7 @@
           <a:p>
             <a:fld id="{4BC48473-ACCD-4242-806A-1249CC2C55A8}" type="datetimeFigureOut">
               <a:rPr lang="en-US" smtClean="0"/>
-              <a:t>10/19/2017</a:t>
+              <a:t>10/21/2017</a:t>
             </a:fld>
             <a:endParaRPr lang="en-US"/>
           </a:p>
@@ -2589,7 +2589,7 @@
           <a:p>
             <a:fld id="{4BC48473-ACCD-4242-806A-1249CC2C55A8}" type="datetimeFigureOut">
               <a:rPr lang="en-US" smtClean="0"/>
-              <a:t>10/19/2017</a:t>
+              <a:t>10/21/2017</a:t>
             </a:fld>
             <a:endParaRPr lang="en-US"/>
           </a:p>
@@ -3192,7 +3192,7 @@
           <a:p>
             <a:fld id="{4BC48473-ACCD-4242-806A-1249CC2C55A8}" type="datetimeFigureOut">
               <a:rPr lang="en-US" smtClean="0"/>
-              <a:t>10/19/2017</a:t>
+              <a:t>10/21/2017</a:t>
             </a:fld>
             <a:endParaRPr lang="en-US"/>
           </a:p>
@@ -4998,7 +4998,7 @@
           <a:p>
             <a:fld id="{4BC48473-ACCD-4242-806A-1249CC2C55A8}" type="datetimeFigureOut">
               <a:rPr lang="en-US" smtClean="0"/>
-              <a:t>10/19/2017</a:t>
+              <a:t>10/21/2017</a:t>
             </a:fld>
             <a:endParaRPr lang="en-US"/>
           </a:p>
@@ -5058,7 +5058,7 @@
   </p:clrMapOvr>
   <p:extLst mod="1">
     <p:ext uri="{DCECCB84-F9BA-43D5-87BE-67443E8EF086}">
-      <p15:sldGuideLst xmlns:p15="http://schemas.microsoft.com/office/powerpoint/2012/main" xmlns=""/>
+      <p15:sldGuideLst xmlns="" xmlns:p15="http://schemas.microsoft.com/office/powerpoint/2012/main"/>
     </p:ext>
   </p:extLst>
 </p:sldLayout>
@@ -5388,7 +5388,7 @@
           <a:p>
             <a:fld id="{4BC48473-ACCD-4242-806A-1249CC2C55A8}" type="datetimeFigureOut">
               <a:rPr lang="en-US" smtClean="0"/>
-              <a:t>10/19/2017</a:t>
+              <a:t>10/21/2017</a:t>
             </a:fld>
             <a:endParaRPr lang="en-US"/>
           </a:p>
@@ -5448,7 +5448,7 @@
   </p:clrMapOvr>
   <p:extLst mod="1">
     <p:ext uri="{DCECCB84-F9BA-43D5-87BE-67443E8EF086}">
-      <p15:sldGuideLst xmlns:p15="http://schemas.microsoft.com/office/powerpoint/2012/main" xmlns=""/>
+      <p15:sldGuideLst xmlns="" xmlns:p15="http://schemas.microsoft.com/office/powerpoint/2012/main"/>
     </p:ext>
   </p:extLst>
 </p:sldLayout>
@@ -5511,7 +5511,7 @@
           <a:p>
             <a:fld id="{4BC48473-ACCD-4242-806A-1249CC2C55A8}" type="datetimeFigureOut">
               <a:rPr lang="en-US" smtClean="0"/>
-              <a:t>10/19/2017</a:t>
+              <a:t>10/21/2017</a:t>
             </a:fld>
             <a:endParaRPr lang="en-US"/>
           </a:p>
@@ -5606,7 +5606,7 @@
           <a:p>
             <a:fld id="{4BC48473-ACCD-4242-806A-1249CC2C55A8}" type="datetimeFigureOut">
               <a:rPr lang="en-US" smtClean="0"/>
-              <a:t>10/19/2017</a:t>
+              <a:t>10/21/2017</a:t>
             </a:fld>
             <a:endParaRPr lang="en-US"/>
           </a:p>
@@ -6371,7 +6371,7 @@
           <a:p>
             <a:fld id="{4BC48473-ACCD-4242-806A-1249CC2C55A8}" type="datetimeFigureOut">
               <a:rPr lang="en-US" smtClean="0"/>
-              <a:t>10/19/2017</a:t>
+              <a:t>10/21/2017</a:t>
             </a:fld>
             <a:endParaRPr lang="en-US"/>
           </a:p>
@@ -6517,7 +6517,7 @@
   </p:clrMapOvr>
   <p:extLst mod="1">
     <p:ext uri="{DCECCB84-F9BA-43D5-87BE-67443E8EF086}">
-      <p15:sldGuideLst xmlns:p15="http://schemas.microsoft.com/office/powerpoint/2012/main" xmlns="">
+      <p15:sldGuideLst xmlns="" xmlns:p15="http://schemas.microsoft.com/office/powerpoint/2012/main">
         <p15:guide id="1" orient="horz" pos="696">
           <p15:clr>
             <a:srgbClr val="FBAE40"/>
@@ -7251,7 +7251,7 @@
           <a:p>
             <a:fld id="{4BC48473-ACCD-4242-806A-1249CC2C55A8}" type="datetimeFigureOut">
               <a:rPr lang="en-US" smtClean="0"/>
-              <a:t>10/19/2017</a:t>
+              <a:t>10/21/2017</a:t>
             </a:fld>
             <a:endParaRPr lang="en-US"/>
           </a:p>
@@ -7516,7 +7516,7 @@
           <a:p>
             <a:fld id="{4BC48473-ACCD-4242-806A-1249CC2C55A8}" type="datetimeFigureOut">
               <a:rPr lang="en-US" smtClean="0"/>
-              <a:t>10/19/2017</a:t>
+              <a:t>10/21/2017</a:t>
             </a:fld>
             <a:endParaRPr lang="en-US"/>
           </a:p>
@@ -8136,7 +8136,7 @@
   </p:txStyles>
   <p:extLst mod="1">
     <p:ext uri="{27BBF7A9-308A-43DC-89C8-2F10F3537804}">
-      <p15:sldGuideLst xmlns:p15="http://schemas.microsoft.com/office/powerpoint/2012/main" xmlns="">
+      <p15:sldGuideLst xmlns="" xmlns:p15="http://schemas.microsoft.com/office/powerpoint/2012/main">
         <p15:guide id="1" pos="792">
           <p15:clr>
             <a:srgbClr val="F26B43"/>
@@ -8350,11 +8350,7 @@
             <a:pPr lvl="1"/>
             <a:r>
               <a:rPr lang="en-IE" dirty="0" smtClean="0"/>
-              <a:t>Border-colour</a:t>
-            </a:r>
-            <a:r>
-              <a:rPr lang="en-IE" dirty="0" smtClean="0"/>
-              <a:t> </a:t>
+              <a:t>Border-colour </a:t>
             </a:r>
             <a:endParaRPr dirty="0"/>
           </a:p>
@@ -8380,7 +8376,7 @@
           </a:prstGeom>
           <a:extLst>
             <a:ext uri="{C572A759-6A51-4108-AA02-DFA0A04FC94B}">
-              <ma14:wrappingTextBoxFlag xmlns="" xmlns:ma14="http://schemas.microsoft.com/office/mac/drawingml/2011/main" val="1"/>
+              <ma14:wrappingTextBoxFlag xmlns:ma14="http://schemas.microsoft.com/office/mac/drawingml/2011/main" xmlns="" val="1"/>
             </a:ext>
           </a:extLst>
         </p:spPr>
@@ -8526,7 +8522,7 @@
           </a:prstGeom>
           <a:extLst>
             <a:ext uri="{C572A759-6A51-4108-AA02-DFA0A04FC94B}">
-              <ma14:wrappingTextBoxFlag xmlns="" xmlns:ma14="http://schemas.microsoft.com/office/mac/drawingml/2011/main" val="1"/>
+              <ma14:wrappingTextBoxFlag xmlns:ma14="http://schemas.microsoft.com/office/mac/drawingml/2011/main" xmlns="" val="1"/>
             </a:ext>
           </a:extLst>
         </p:spPr>
@@ -8580,11 +8576,11 @@
   <p:clrMapOvr>
     <a:masterClrMapping/>
   </p:clrMapOvr>
-  <mc:AlternateContent xmlns:mc="http://schemas.openxmlformats.org/markup-compatibility/2006">
-    <mc:Choice xmlns:p14="http://schemas.microsoft.com/office/powerpoint/2010/main" Requires="p14">
+  <mc:AlternateContent xmlns:mc="http://schemas.openxmlformats.org/markup-compatibility/2006" xmlns:p14="http://schemas.microsoft.com/office/powerpoint/2010/main">
+    <mc:Choice Requires="p14">
       <p:transition spd="slow" p14:dur="2000"/>
     </mc:Choice>
-    <mc:Fallback>
+    <mc:Fallback xmlns="">
       <p:transition spd="slow"/>
     </mc:Fallback>
   </mc:AlternateContent>
@@ -8680,7 +8676,7 @@
           </a:prstGeom>
           <a:extLst>
             <a:ext uri="{C572A759-6A51-4108-AA02-DFA0A04FC94B}">
-              <ma14:wrappingTextBoxFlag xmlns="" xmlns:ma14="http://schemas.microsoft.com/office/mac/drawingml/2011/main" val="1"/>
+              <ma14:wrappingTextBoxFlag xmlns:ma14="http://schemas.microsoft.com/office/mac/drawingml/2011/main" xmlns="" val="1"/>
             </a:ext>
           </a:extLst>
         </p:spPr>
@@ -8813,7 +8809,7 @@
           </a:prstGeom>
           <a:extLst>
             <a:ext uri="{C572A759-6A51-4108-AA02-DFA0A04FC94B}">
-              <ma14:wrappingTextBoxFlag xmlns="" xmlns:ma14="http://schemas.microsoft.com/office/mac/drawingml/2011/main" val="1"/>
+              <ma14:wrappingTextBoxFlag xmlns:ma14="http://schemas.microsoft.com/office/mac/drawingml/2011/main" xmlns="" val="1"/>
             </a:ext>
           </a:extLst>
         </p:spPr>
@@ -8940,11 +8936,11 @@
   <p:clrMapOvr>
     <a:masterClrMapping/>
   </p:clrMapOvr>
-  <mc:AlternateContent xmlns:mc="http://schemas.openxmlformats.org/markup-compatibility/2006">
-    <mc:Choice xmlns:p14="http://schemas.microsoft.com/office/powerpoint/2010/main" Requires="p14">
+  <mc:AlternateContent xmlns:mc="http://schemas.openxmlformats.org/markup-compatibility/2006" xmlns:p14="http://schemas.microsoft.com/office/powerpoint/2010/main">
+    <mc:Choice Requires="p14">
       <p:transition spd="slow" p14:dur="2000"/>
     </mc:Choice>
-    <mc:Fallback>
+    <mc:Fallback xmlns="">
       <p:transition spd="slow"/>
     </mc:Fallback>
   </mc:AlternateContent>
@@ -9028,7 +9024,7 @@
           </a:prstGeom>
           <a:extLst>
             <a:ext uri="{C572A759-6A51-4108-AA02-DFA0A04FC94B}">
-              <ma14:wrappingTextBoxFlag xmlns="" xmlns:ma14="http://schemas.microsoft.com/office/mac/drawingml/2011/main" val="1"/>
+              <ma14:wrappingTextBoxFlag xmlns:ma14="http://schemas.microsoft.com/office/mac/drawingml/2011/main" xmlns="" val="1"/>
             </a:ext>
           </a:extLst>
         </p:spPr>
@@ -9082,11 +9078,11 @@
   <p:clrMapOvr>
     <a:masterClrMapping/>
   </p:clrMapOvr>
-  <mc:AlternateContent xmlns:mc="http://schemas.openxmlformats.org/markup-compatibility/2006">
-    <mc:Choice xmlns:p14="http://schemas.microsoft.com/office/powerpoint/2010/main" Requires="p14">
+  <mc:AlternateContent xmlns:mc="http://schemas.openxmlformats.org/markup-compatibility/2006" xmlns:p14="http://schemas.microsoft.com/office/powerpoint/2010/main">
+    <mc:Choice Requires="p14">
       <p:transition spd="slow" p14:dur="2000"/>
     </mc:Choice>
-    <mc:Fallback>
+    <mc:Fallback xmlns="">
       <p:transition spd="slow"/>
     </mc:Fallback>
   </mc:AlternateContent>
@@ -9184,7 +9180,7 @@
           </a:prstGeom>
           <a:extLst>
             <a:ext uri="{C572A759-6A51-4108-AA02-DFA0A04FC94B}">
-              <ma14:wrappingTextBoxFlag xmlns="" xmlns:ma14="http://schemas.microsoft.com/office/mac/drawingml/2011/main" val="1"/>
+              <ma14:wrappingTextBoxFlag xmlns:ma14="http://schemas.microsoft.com/office/mac/drawingml/2011/main" xmlns="" val="1"/>
             </a:ext>
           </a:extLst>
         </p:spPr>
@@ -9224,7 +9220,7 @@
           </a:ln>
           <a:extLst>
             <a:ext uri="{C572A759-6A51-4108-AA02-DFA0A04FC94B}">
-              <ma14:wrappingTextBoxFlag xmlns="" xmlns:ma14="http://schemas.microsoft.com/office/mac/drawingml/2011/main" val="1"/>
+              <ma14:wrappingTextBoxFlag xmlns:ma14="http://schemas.microsoft.com/office/mac/drawingml/2011/main" xmlns="" val="1"/>
             </a:ext>
           </a:extLst>
         </p:spPr>
@@ -10175,7 +10171,7 @@
           </a:prstGeom>
           <a:extLst>
             <a:ext uri="{C572A759-6A51-4108-AA02-DFA0A04FC94B}">
-              <ma14:wrappingTextBoxFlag xmlns="" xmlns:ma14="http://schemas.microsoft.com/office/mac/drawingml/2011/main" val="1"/>
+              <ma14:wrappingTextBoxFlag xmlns:ma14="http://schemas.microsoft.com/office/mac/drawingml/2011/main" xmlns="" val="1"/>
             </a:ext>
           </a:extLst>
         </p:spPr>
@@ -10238,7 +10234,7 @@
           </a:ln>
           <a:extLst>
             <a:ext uri="{C572A759-6A51-4108-AA02-DFA0A04FC94B}">
-              <ma14:wrappingTextBoxFlag xmlns="" xmlns:ma14="http://schemas.microsoft.com/office/mac/drawingml/2011/main" val="1"/>
+              <ma14:wrappingTextBoxFlag xmlns:ma14="http://schemas.microsoft.com/office/mac/drawingml/2011/main" xmlns="" val="1"/>
             </a:ext>
           </a:extLst>
         </p:spPr>
@@ -10269,11 +10265,11 @@
   <p:clrMapOvr>
     <a:masterClrMapping/>
   </p:clrMapOvr>
-  <mc:AlternateContent xmlns:mc="http://schemas.openxmlformats.org/markup-compatibility/2006">
-    <mc:Choice xmlns:p14="http://schemas.microsoft.com/office/powerpoint/2010/main" Requires="p14">
+  <mc:AlternateContent xmlns:mc="http://schemas.openxmlformats.org/markup-compatibility/2006" xmlns:p14="http://schemas.microsoft.com/office/powerpoint/2010/main">
+    <mc:Choice Requires="p14">
       <p:transition spd="slow" p14:dur="2000"/>
     </mc:Choice>
-    <mc:Fallback>
+    <mc:Fallback xmlns="">
       <p:transition spd="slow"/>
     </mc:Fallback>
   </mc:AlternateContent>
@@ -10398,7 +10394,7 @@
           </a:prstGeom>
           <a:extLst>
             <a:ext uri="{C572A759-6A51-4108-AA02-DFA0A04FC94B}">
-              <ma14:wrappingTextBoxFlag xmlns="" xmlns:ma14="http://schemas.microsoft.com/office/mac/drawingml/2011/main" val="1"/>
+              <ma14:wrappingTextBoxFlag xmlns:ma14="http://schemas.microsoft.com/office/mac/drawingml/2011/main" xmlns="" val="1"/>
             </a:ext>
           </a:extLst>
         </p:spPr>
@@ -10470,7 +10466,7 @@
           </a:ln>
           <a:extLst>
             <a:ext uri="{C572A759-6A51-4108-AA02-DFA0A04FC94B}">
-              <ma14:wrappingTextBoxFlag xmlns="" xmlns:ma14="http://schemas.microsoft.com/office/mac/drawingml/2011/main" val="1"/>
+              <ma14:wrappingTextBoxFlag xmlns:ma14="http://schemas.microsoft.com/office/mac/drawingml/2011/main" xmlns="" val="1"/>
             </a:ext>
           </a:extLst>
         </p:spPr>
@@ -11016,7 +11012,7 @@
           </a:prstGeom>
           <a:extLst>
             <a:ext uri="{C572A759-6A51-4108-AA02-DFA0A04FC94B}">
-              <ma14:wrappingTextBoxFlag xmlns="" xmlns:ma14="http://schemas.microsoft.com/office/mac/drawingml/2011/main" val="1"/>
+              <ma14:wrappingTextBoxFlag xmlns:ma14="http://schemas.microsoft.com/office/mac/drawingml/2011/main" xmlns="" val="1"/>
             </a:ext>
           </a:extLst>
         </p:spPr>
@@ -11088,7 +11084,7 @@
           </a:ln>
           <a:extLst>
             <a:ext uri="{C572A759-6A51-4108-AA02-DFA0A04FC94B}">
-              <ma14:wrappingTextBoxFlag xmlns="" xmlns:ma14="http://schemas.microsoft.com/office/mac/drawingml/2011/main" val="1"/>
+              <ma14:wrappingTextBoxFlag xmlns:ma14="http://schemas.microsoft.com/office/mac/drawingml/2011/main" xmlns="" val="1"/>
             </a:ext>
           </a:extLst>
         </p:spPr>
@@ -12489,14 +12485,24 @@
           <a:lstStyle/>
           <a:p>
             <a:r>
-              <a:rPr lang="en-US" dirty="0" smtClean="0"/>
-              <a:t>position</a:t>
+              <a:rPr lang="en-US" dirty="0"/>
+              <a:t>P</a:t>
+            </a:r>
+            <a:r>
+              <a:rPr lang="en-US" smtClean="0"/>
+              <a:t>osition</a:t>
+            </a:r>
+            <a:r>
+              <a:rPr lang="en-US" smtClean="0">
+                <a:sym typeface="Helvetica Neue"/>
+              </a:rPr>
+              <a:t> </a:t>
             </a:r>
             <a:r>
               <a:rPr lang="en-US" dirty="0" smtClean="0">
                 <a:sym typeface="Helvetica Neue"/>
               </a:rPr>
-              <a:t> property often used to make more complex layouts.</a:t>
+              <a:t>property often used to make more complex layouts.</a:t>
             </a:r>
           </a:p>
           <a:p>
@@ -12535,23 +12541,7 @@
             <a:pPr lvl="1"/>
             <a:r>
               <a:rPr lang="en-US" dirty="0" smtClean="0"/>
-              <a:t>A static element is said to be </a:t>
-            </a:r>
-            <a:r>
-              <a:rPr lang="en-US" dirty="0" smtClean="0"/>
-              <a:t>not positioned </a:t>
-            </a:r>
-            <a:r>
-              <a:rPr lang="en-US" dirty="0" smtClean="0"/>
-              <a:t>and an element with its position set to anything else is said to be </a:t>
-            </a:r>
-            <a:r>
-              <a:rPr lang="en-US" dirty="0" smtClean="0"/>
-              <a:t>positioned</a:t>
-            </a:r>
-            <a:r>
-              <a:rPr lang="en-US" dirty="0" smtClean="0"/>
-              <a:t>.</a:t>
+              <a:t>A static element is said to be not positioned and an element with its position set to anything else is said to be positioned.</a:t>
             </a:r>
             <a:endParaRPr lang="en-US" dirty="0"/>
           </a:p>
@@ -13827,7 +13817,7 @@
           </a:prstGeom>
           <a:extLst>
             <a:ext uri="{C572A759-6A51-4108-AA02-DFA0A04FC94B}">
-              <ma14:wrappingTextBoxFlag xmlns="" xmlns:ma14="http://schemas.microsoft.com/office/mac/drawingml/2011/main" val="1"/>
+              <ma14:wrappingTextBoxFlag xmlns:ma14="http://schemas.microsoft.com/office/mac/drawingml/2011/main" xmlns="" val="1"/>
             </a:ext>
           </a:extLst>
         </p:spPr>
@@ -13867,7 +13857,7 @@
           </a:ln>
           <a:extLst>
             <a:ext uri="{C572A759-6A51-4108-AA02-DFA0A04FC94B}">
-              <ma14:wrappingTextBoxFlag xmlns="" xmlns:ma14="http://schemas.microsoft.com/office/mac/drawingml/2011/main" val="1"/>
+              <ma14:wrappingTextBoxFlag xmlns:ma14="http://schemas.microsoft.com/office/mac/drawingml/2011/main" xmlns="" val="1"/>
             </a:ext>
           </a:extLst>
         </p:spPr>
@@ -14197,7 +14187,7 @@
           </a:ln>
           <a:extLst>
             <a:ext uri="{C572A759-6A51-4108-AA02-DFA0A04FC94B}">
-              <ma14:wrappingTextBoxFlag xmlns="" xmlns:ma14="http://schemas.microsoft.com/office/mac/drawingml/2011/main" val="1"/>
+              <ma14:wrappingTextBoxFlag xmlns:ma14="http://schemas.microsoft.com/office/mac/drawingml/2011/main" xmlns="" val="1"/>
             </a:ext>
           </a:extLst>
         </p:spPr>
@@ -14824,7 +14814,7 @@
           </a:prstGeom>
           <a:extLst>
             <a:ext uri="{C572A759-6A51-4108-AA02-DFA0A04FC94B}">
-              <ma14:wrappingTextBoxFlag xmlns="" xmlns:ma14="http://schemas.microsoft.com/office/mac/drawingml/2011/main" val="1"/>
+              <ma14:wrappingTextBoxFlag xmlns:ma14="http://schemas.microsoft.com/office/mac/drawingml/2011/main" xmlns="" val="1"/>
             </a:ext>
           </a:extLst>
         </p:spPr>
@@ -14980,7 +14970,7 @@
           </a:prstGeom>
           <a:extLst>
             <a:ext uri="{C572A759-6A51-4108-AA02-DFA0A04FC94B}">
-              <ma14:wrappingTextBoxFlag xmlns="" xmlns:ma14="http://schemas.microsoft.com/office/mac/drawingml/2011/main" val="1"/>
+              <ma14:wrappingTextBoxFlag xmlns:ma14="http://schemas.microsoft.com/office/mac/drawingml/2011/main" xmlns="" val="1"/>
             </a:ext>
           </a:extLst>
         </p:spPr>
@@ -15100,7 +15090,7 @@
           </a:prstGeom>
           <a:extLst>
             <a:ext uri="{C572A759-6A51-4108-AA02-DFA0A04FC94B}">
-              <ma14:wrappingTextBoxFlag xmlns="" xmlns:ma14="http://schemas.microsoft.com/office/mac/drawingml/2011/main" val="1"/>
+              <ma14:wrappingTextBoxFlag xmlns:ma14="http://schemas.microsoft.com/office/mac/drawingml/2011/main" xmlns="" val="1"/>
             </a:ext>
           </a:extLst>
         </p:spPr>
@@ -15267,7 +15257,7 @@
           </a:prstGeom>
           <a:extLst>
             <a:ext uri="{C572A759-6A51-4108-AA02-DFA0A04FC94B}">
-              <ma14:wrappingTextBoxFlag xmlns="" xmlns:ma14="http://schemas.microsoft.com/office/mac/drawingml/2011/main" val="1"/>
+              <ma14:wrappingTextBoxFlag xmlns:ma14="http://schemas.microsoft.com/office/mac/drawingml/2011/main" xmlns="" val="1"/>
             </a:ext>
           </a:extLst>
         </p:spPr>
@@ -15439,7 +15429,7 @@
           </a:prstGeom>
           <a:extLst>
             <a:ext uri="{C572A759-6A51-4108-AA02-DFA0A04FC94B}">
-              <ma14:wrappingTextBoxFlag xmlns="" xmlns:ma14="http://schemas.microsoft.com/office/mac/drawingml/2011/main" val="1"/>
+              <ma14:wrappingTextBoxFlag xmlns:ma14="http://schemas.microsoft.com/office/mac/drawingml/2011/main" xmlns="" val="1"/>
             </a:ext>
           </a:extLst>
         </p:spPr>
@@ -15668,7 +15658,7 @@
           </a:prstGeom>
           <a:extLst>
             <a:ext uri="{C572A759-6A51-4108-AA02-DFA0A04FC94B}">
-              <ma14:wrappingTextBoxFlag xmlns="" xmlns:ma14="http://schemas.microsoft.com/office/mac/drawingml/2011/main" val="1"/>
+              <ma14:wrappingTextBoxFlag xmlns:ma14="http://schemas.microsoft.com/office/mac/drawingml/2011/main" xmlns="" val="1"/>
             </a:ext>
           </a:extLst>
         </p:spPr>
@@ -15980,7 +15970,7 @@
   <a:extraClrSchemeLst/>
   <a:extLst>
     <a:ext uri="{05A4C25C-085E-4340-85A3-A5531E510DB2}">
-      <thm15:themeFamily xmlns:thm15="http://schemas.microsoft.com/office/thememl/2012/main" xmlns="" name="Badge" id="{71A07785-5930-41D4-9A83-E23602B48E98}" vid="{771EA782-DFA6-45B1-AEA3-661F1715B310}"/>
+      <thm15:themeFamily xmlns="" xmlns:thm15="http://schemas.microsoft.com/office/thememl/2012/main" name="Badge" id="{71A07785-5930-41D4-9A83-E23602B48E98}" vid="{771EA782-DFA6-45B1-AEA3-661F1715B310}"/>
     </a:ext>
   </a:extLst>
 </a:theme>
@@ -16241,7 +16231,7 @@
   <a:extraClrSchemeLst/>
   <a:extLst>
     <a:ext uri="{05A4C25C-085E-4340-85A3-A5531E510DB2}">
-      <thm15:themeFamily xmlns:thm15="http://schemas.microsoft.com/office/thememl/2012/main" xmlns="" name="Office Theme" id="{62F939B6-93AF-4DB8-9C6B-D6C7DFDC589F}" vid="{4A3C46E8-61CC-4603-A589-7422A47A8E4A}"/>
+      <thm15:themeFamily xmlns="" xmlns:thm15="http://schemas.microsoft.com/office/thememl/2012/main" name="Office Theme" id="{62F939B6-93AF-4DB8-9C6B-D6C7DFDC589F}" vid="{4A3C46E8-61CC-4603-A589-7422A47A8E4A}"/>
     </a:ext>
   </a:extLst>
 </a:theme>

</xml_diff>